<commit_message>
Adding the slides final version
</commit_message>
<xml_diff>
--- a/Documents/Presentation.pptx
+++ b/Documents/Presentation.pptx
@@ -15,6 +15,7 @@
     <p:sldId id="261" r:id="rId9"/>
     <p:sldId id="262" r:id="rId10"/>
     <p:sldId id="263" r:id="rId11"/>
+    <p:sldId id="266" r:id="rId12"/>
   </p:sldIdLst>
   <p:sldSz cx="12192000" cy="6858000"/>
   <p:notesSz cx="6858000" cy="9144000"/>
@@ -4157,6 +4158,134 @@
 </p:sld>
 </file>
 
+<file path=ppt/slides/slide11.xml><?xml version="1.0" encoding="utf-8"?>
+<p:sld xmlns:a="http://schemas.openxmlformats.org/drawingml/2006/main" xmlns:r="http://schemas.openxmlformats.org/officeDocument/2006/relationships" xmlns:p="http://schemas.openxmlformats.org/presentationml/2006/main">
+  <p:cSld>
+    <p:spTree>
+      <p:nvGrpSpPr>
+        <p:cNvPr id="1" name=""/>
+        <p:cNvGrpSpPr/>
+        <p:nvPr/>
+      </p:nvGrpSpPr>
+      <p:grpSpPr>
+        <a:xfrm>
+          <a:off x="0" y="0"/>
+          <a:ext cx="0" cy="0"/>
+          <a:chOff x="0" y="0"/>
+          <a:chExt cx="0" cy="0"/>
+        </a:xfrm>
+      </p:grpSpPr>
+      <p:sp>
+        <p:nvSpPr>
+          <p:cNvPr id="2" name="Title 1">
+            <a:extLst>
+              <a:ext uri="{FF2B5EF4-FFF2-40B4-BE49-F238E27FC236}">
+                <a16:creationId xmlns:a16="http://schemas.microsoft.com/office/drawing/2014/main" id="{CA3FBA1D-9584-FD49-A1C0-3F9B7211EFA4}"/>
+              </a:ext>
+            </a:extLst>
+          </p:cNvPr>
+          <p:cNvSpPr>
+            <a:spLocks noGrp="1"/>
+          </p:cNvSpPr>
+          <p:nvPr>
+            <p:ph type="title"/>
+          </p:nvPr>
+        </p:nvSpPr>
+        <p:spPr/>
+        <p:txBody>
+          <a:bodyPr/>
+          <a:lstStyle/>
+          <a:p>
+            <a:r>
+              <a:rPr lang="en-MX" dirty="0"/>
+              <a:t>Thank you for your kind attention!</a:t>
+            </a:r>
+          </a:p>
+        </p:txBody>
+      </p:sp>
+      <p:sp>
+        <p:nvSpPr>
+          <p:cNvPr id="3" name="Content Placeholder 2">
+            <a:extLst>
+              <a:ext uri="{FF2B5EF4-FFF2-40B4-BE49-F238E27FC236}">
+                <a16:creationId xmlns:a16="http://schemas.microsoft.com/office/drawing/2014/main" id="{BB98FD5A-5527-DA44-9A74-18DE94535D47}"/>
+              </a:ext>
+            </a:extLst>
+          </p:cNvPr>
+          <p:cNvSpPr>
+            <a:spLocks noGrp="1"/>
+          </p:cNvSpPr>
+          <p:nvPr>
+            <p:ph idx="1"/>
+          </p:nvPr>
+        </p:nvSpPr>
+        <p:spPr/>
+        <p:txBody>
+          <a:bodyPr/>
+          <a:lstStyle/>
+          <a:p>
+            <a:pPr lvl="1">
+              <a:buFont typeface="Arial" panose="020B0604020202020204" pitchFamily="34" charset="0"/>
+              <a:buChar char="•"/>
+            </a:pPr>
+            <a:endParaRPr lang="en-MX" dirty="0"/>
+          </a:p>
+          <a:p>
+            <a:pPr marL="201168" lvl="1" indent="0">
+              <a:buNone/>
+            </a:pPr>
+            <a:endParaRPr lang="en-MX" dirty="0"/>
+          </a:p>
+          <a:p>
+            <a:pPr lvl="1">
+              <a:buFont typeface="Arial" panose="020B0604020202020204" pitchFamily="34" charset="0"/>
+              <a:buChar char="•"/>
+            </a:pPr>
+            <a:endParaRPr lang="en-MX" dirty="0"/>
+          </a:p>
+          <a:p>
+            <a:pPr lvl="1">
+              <a:buFont typeface="Arial" panose="020B0604020202020204" pitchFamily="34" charset="0"/>
+              <a:buChar char="•"/>
+            </a:pPr>
+            <a:r>
+              <a:rPr lang="en-MX" dirty="0"/>
+              <a:t>Please visit my github to check the code:</a:t>
+            </a:r>
+          </a:p>
+          <a:p>
+            <a:pPr marL="201168" lvl="1" indent="0">
+              <a:buNone/>
+            </a:pPr>
+            <a:r>
+              <a:rPr lang="en-US" dirty="0">
+                <a:hlinkClick r:id="rId2"/>
+              </a:rPr>
+              <a:t>https://github.com/cmaroblesg/Advanced_DataScience_Capstone</a:t>
+            </a:r>
+            <a:endParaRPr lang="en-US" dirty="0"/>
+          </a:p>
+          <a:p>
+            <a:pPr marL="201168" lvl="1" indent="0">
+              <a:buNone/>
+            </a:pPr>
+            <a:endParaRPr lang="en-US" dirty="0"/>
+          </a:p>
+        </p:txBody>
+      </p:sp>
+    </p:spTree>
+    <p:extLst>
+      <p:ext uri="{BB962C8B-B14F-4D97-AF65-F5344CB8AC3E}">
+        <p14:creationId xmlns:p14="http://schemas.microsoft.com/office/powerpoint/2010/main" val="1577789634"/>
+      </p:ext>
+    </p:extLst>
+  </p:cSld>
+  <p:clrMapOvr>
+    <a:masterClrMapping/>
+  </p:clrMapOvr>
+</p:sld>
+</file>
+
 <file path=ppt/slides/slide2.xml><?xml version="1.0" encoding="utf-8"?>
 <p:sld xmlns:a="http://schemas.openxmlformats.org/drawingml/2006/main" xmlns:r="http://schemas.openxmlformats.org/officeDocument/2006/relationships" xmlns:p="http://schemas.openxmlformats.org/presentationml/2006/main">
   <p:cSld>

</xml_diff>

<commit_message>
Adding all the files
</commit_message>
<xml_diff>
--- a/Documents/Presentation.pptx
+++ b/Documents/Presentation.pptx
@@ -4,6 +4,9 @@
   <p:sldMasterIdLst>
     <p:sldMasterId id="2147483674" r:id="rId1"/>
   </p:sldMasterIdLst>
+  <p:notesMasterIdLst>
+    <p:notesMasterId r:id="rId13"/>
+  </p:notesMasterIdLst>
   <p:sldIdLst>
     <p:sldId id="256" r:id="rId2"/>
     <p:sldId id="257" r:id="rId3"/>
@@ -120,6 +123,686 @@
     </p:ext>
   </p:extLst>
 </p:presentation>
+</file>
+
+<file path=ppt/notesMasters/notesMaster1.xml><?xml version="1.0" encoding="utf-8"?>
+<p:notesMaster xmlns:a="http://schemas.openxmlformats.org/drawingml/2006/main" xmlns:r="http://schemas.openxmlformats.org/officeDocument/2006/relationships" xmlns:p="http://schemas.openxmlformats.org/presentationml/2006/main">
+  <p:cSld>
+    <p:bg>
+      <p:bgRef idx="1001">
+        <a:schemeClr val="bg1"/>
+      </p:bgRef>
+    </p:bg>
+    <p:spTree>
+      <p:nvGrpSpPr>
+        <p:cNvPr id="1" name=""/>
+        <p:cNvGrpSpPr/>
+        <p:nvPr/>
+      </p:nvGrpSpPr>
+      <p:grpSpPr>
+        <a:xfrm>
+          <a:off x="0" y="0"/>
+          <a:ext cx="0" cy="0"/>
+          <a:chOff x="0" y="0"/>
+          <a:chExt cx="0" cy="0"/>
+        </a:xfrm>
+      </p:grpSpPr>
+      <p:sp>
+        <p:nvSpPr>
+          <p:cNvPr id="2" name="Header Placeholder 1"/>
+          <p:cNvSpPr>
+            <a:spLocks noGrp="1"/>
+          </p:cNvSpPr>
+          <p:nvPr>
+            <p:ph type="hdr" sz="quarter"/>
+          </p:nvPr>
+        </p:nvSpPr>
+        <p:spPr>
+          <a:xfrm>
+            <a:off x="0" y="0"/>
+            <a:ext cx="2971800" cy="458788"/>
+          </a:xfrm>
+          <a:prstGeom prst="rect">
+            <a:avLst/>
+          </a:prstGeom>
+        </p:spPr>
+        <p:txBody>
+          <a:bodyPr vert="horz" lIns="91440" tIns="45720" rIns="91440" bIns="45720" rtlCol="0"/>
+          <a:lstStyle>
+            <a:lvl1pPr algn="l">
+              <a:defRPr sz="1200"/>
+            </a:lvl1pPr>
+          </a:lstStyle>
+          <a:p>
+            <a:endParaRPr lang="en-MX"/>
+          </a:p>
+        </p:txBody>
+      </p:sp>
+      <p:sp>
+        <p:nvSpPr>
+          <p:cNvPr id="3" name="Date Placeholder 2"/>
+          <p:cNvSpPr>
+            <a:spLocks noGrp="1"/>
+          </p:cNvSpPr>
+          <p:nvPr>
+            <p:ph type="dt" idx="1"/>
+          </p:nvPr>
+        </p:nvSpPr>
+        <p:spPr>
+          <a:xfrm>
+            <a:off x="3884613" y="0"/>
+            <a:ext cx="2971800" cy="458788"/>
+          </a:xfrm>
+          <a:prstGeom prst="rect">
+            <a:avLst/>
+          </a:prstGeom>
+        </p:spPr>
+        <p:txBody>
+          <a:bodyPr vert="horz" lIns="91440" tIns="45720" rIns="91440" bIns="45720" rtlCol="0"/>
+          <a:lstStyle>
+            <a:lvl1pPr algn="r">
+              <a:defRPr sz="1200"/>
+            </a:lvl1pPr>
+          </a:lstStyle>
+          <a:p>
+            <a:fld id="{59BD1B42-93CF-654B-A425-1791532A518A}" type="datetimeFigureOut">
+              <a:rPr lang="en-MX" smtClean="0"/>
+              <a:t>28/10/20</a:t>
+            </a:fld>
+            <a:endParaRPr lang="en-MX"/>
+          </a:p>
+        </p:txBody>
+      </p:sp>
+      <p:sp>
+        <p:nvSpPr>
+          <p:cNvPr id="4" name="Slide Image Placeholder 3"/>
+          <p:cNvSpPr>
+            <a:spLocks noGrp="1" noRot="1" noChangeAspect="1"/>
+          </p:cNvSpPr>
+          <p:nvPr>
+            <p:ph type="sldImg" idx="2"/>
+          </p:nvPr>
+        </p:nvSpPr>
+        <p:spPr>
+          <a:xfrm>
+            <a:off x="685800" y="1143000"/>
+            <a:ext cx="5486400" cy="3086100"/>
+          </a:xfrm>
+          <a:prstGeom prst="rect">
+            <a:avLst/>
+          </a:prstGeom>
+          <a:noFill/>
+          <a:ln w="12700">
+            <a:solidFill>
+              <a:prstClr val="black"/>
+            </a:solidFill>
+          </a:ln>
+        </p:spPr>
+        <p:txBody>
+          <a:bodyPr vert="horz" lIns="91440" tIns="45720" rIns="91440" bIns="45720" rtlCol="0" anchor="ctr"/>
+          <a:lstStyle/>
+          <a:p>
+            <a:endParaRPr lang="en-MX"/>
+          </a:p>
+        </p:txBody>
+      </p:sp>
+      <p:sp>
+        <p:nvSpPr>
+          <p:cNvPr id="5" name="Notes Placeholder 4"/>
+          <p:cNvSpPr>
+            <a:spLocks noGrp="1"/>
+          </p:cNvSpPr>
+          <p:nvPr>
+            <p:ph type="body" sz="quarter" idx="3"/>
+          </p:nvPr>
+        </p:nvSpPr>
+        <p:spPr>
+          <a:xfrm>
+            <a:off x="685800" y="4400550"/>
+            <a:ext cx="5486400" cy="3600450"/>
+          </a:xfrm>
+          <a:prstGeom prst="rect">
+            <a:avLst/>
+          </a:prstGeom>
+        </p:spPr>
+        <p:txBody>
+          <a:bodyPr vert="horz" lIns="91440" tIns="45720" rIns="91440" bIns="45720" rtlCol="0"/>
+          <a:lstStyle/>
+          <a:p>
+            <a:pPr lvl="0"/>
+            <a:r>
+              <a:rPr lang="en-US"/>
+              <a:t>Click to edit Master text styles</a:t>
+            </a:r>
+          </a:p>
+          <a:p>
+            <a:pPr lvl="1"/>
+            <a:r>
+              <a:rPr lang="en-US"/>
+              <a:t>Second level</a:t>
+            </a:r>
+          </a:p>
+          <a:p>
+            <a:pPr lvl="2"/>
+            <a:r>
+              <a:rPr lang="en-US"/>
+              <a:t>Third level</a:t>
+            </a:r>
+          </a:p>
+          <a:p>
+            <a:pPr lvl="3"/>
+            <a:r>
+              <a:rPr lang="en-US"/>
+              <a:t>Fourth level</a:t>
+            </a:r>
+          </a:p>
+          <a:p>
+            <a:pPr lvl="4"/>
+            <a:r>
+              <a:rPr lang="en-US"/>
+              <a:t>Fifth level</a:t>
+            </a:r>
+            <a:endParaRPr lang="en-MX"/>
+          </a:p>
+        </p:txBody>
+      </p:sp>
+      <p:sp>
+        <p:nvSpPr>
+          <p:cNvPr id="6" name="Footer Placeholder 5"/>
+          <p:cNvSpPr>
+            <a:spLocks noGrp="1"/>
+          </p:cNvSpPr>
+          <p:nvPr>
+            <p:ph type="ftr" sz="quarter" idx="4"/>
+          </p:nvPr>
+        </p:nvSpPr>
+        <p:spPr>
+          <a:xfrm>
+            <a:off x="0" y="8685213"/>
+            <a:ext cx="2971800" cy="458787"/>
+          </a:xfrm>
+          <a:prstGeom prst="rect">
+            <a:avLst/>
+          </a:prstGeom>
+        </p:spPr>
+        <p:txBody>
+          <a:bodyPr vert="horz" lIns="91440" tIns="45720" rIns="91440" bIns="45720" rtlCol="0" anchor="b"/>
+          <a:lstStyle>
+            <a:lvl1pPr algn="l">
+              <a:defRPr sz="1200"/>
+            </a:lvl1pPr>
+          </a:lstStyle>
+          <a:p>
+            <a:endParaRPr lang="en-MX"/>
+          </a:p>
+        </p:txBody>
+      </p:sp>
+      <p:sp>
+        <p:nvSpPr>
+          <p:cNvPr id="7" name="Slide Number Placeholder 6"/>
+          <p:cNvSpPr>
+            <a:spLocks noGrp="1"/>
+          </p:cNvSpPr>
+          <p:nvPr>
+            <p:ph type="sldNum" sz="quarter" idx="5"/>
+          </p:nvPr>
+        </p:nvSpPr>
+        <p:spPr>
+          <a:xfrm>
+            <a:off x="3884613" y="8685213"/>
+            <a:ext cx="2971800" cy="458787"/>
+          </a:xfrm>
+          <a:prstGeom prst="rect">
+            <a:avLst/>
+          </a:prstGeom>
+        </p:spPr>
+        <p:txBody>
+          <a:bodyPr vert="horz" lIns="91440" tIns="45720" rIns="91440" bIns="45720" rtlCol="0" anchor="b"/>
+          <a:lstStyle>
+            <a:lvl1pPr algn="r">
+              <a:defRPr sz="1200"/>
+            </a:lvl1pPr>
+          </a:lstStyle>
+          <a:p>
+            <a:fld id="{C72C844A-9A40-6A43-B5F1-D3CA0856CF8A}" type="slidenum">
+              <a:rPr lang="en-MX" smtClean="0"/>
+              <a:t>‹#›</a:t>
+            </a:fld>
+            <a:endParaRPr lang="en-MX"/>
+          </a:p>
+        </p:txBody>
+      </p:sp>
+    </p:spTree>
+    <p:extLst>
+      <p:ext uri="{BB962C8B-B14F-4D97-AF65-F5344CB8AC3E}">
+        <p14:creationId xmlns:p14="http://schemas.microsoft.com/office/powerpoint/2010/main" val="1417665761"/>
+      </p:ext>
+    </p:extLst>
+  </p:cSld>
+  <p:clrMap bg1="lt1" tx1="dk1" bg2="lt2" tx2="dk2" accent1="accent1" accent2="accent2" accent3="accent3" accent4="accent4" accent5="accent5" accent6="accent6" hlink="hlink" folHlink="folHlink"/>
+  <p:notesStyle>
+    <a:lvl1pPr marL="0" algn="l" defTabSz="914400" rtl="0" eaLnBrk="1" latinLnBrk="0" hangingPunct="1">
+      <a:defRPr sz="1200" kern="1200">
+        <a:solidFill>
+          <a:schemeClr val="tx1"/>
+        </a:solidFill>
+        <a:latin typeface="+mn-lt"/>
+        <a:ea typeface="+mn-ea"/>
+        <a:cs typeface="+mn-cs"/>
+      </a:defRPr>
+    </a:lvl1pPr>
+    <a:lvl2pPr marL="457200" algn="l" defTabSz="914400" rtl="0" eaLnBrk="1" latinLnBrk="0" hangingPunct="1">
+      <a:defRPr sz="1200" kern="1200">
+        <a:solidFill>
+          <a:schemeClr val="tx1"/>
+        </a:solidFill>
+        <a:latin typeface="+mn-lt"/>
+        <a:ea typeface="+mn-ea"/>
+        <a:cs typeface="+mn-cs"/>
+      </a:defRPr>
+    </a:lvl2pPr>
+    <a:lvl3pPr marL="914400" algn="l" defTabSz="914400" rtl="0" eaLnBrk="1" latinLnBrk="0" hangingPunct="1">
+      <a:defRPr sz="1200" kern="1200">
+        <a:solidFill>
+          <a:schemeClr val="tx1"/>
+        </a:solidFill>
+        <a:latin typeface="+mn-lt"/>
+        <a:ea typeface="+mn-ea"/>
+        <a:cs typeface="+mn-cs"/>
+      </a:defRPr>
+    </a:lvl3pPr>
+    <a:lvl4pPr marL="1371600" algn="l" defTabSz="914400" rtl="0" eaLnBrk="1" latinLnBrk="0" hangingPunct="1">
+      <a:defRPr sz="1200" kern="1200">
+        <a:solidFill>
+          <a:schemeClr val="tx1"/>
+        </a:solidFill>
+        <a:latin typeface="+mn-lt"/>
+        <a:ea typeface="+mn-ea"/>
+        <a:cs typeface="+mn-cs"/>
+      </a:defRPr>
+    </a:lvl4pPr>
+    <a:lvl5pPr marL="1828800" algn="l" defTabSz="914400" rtl="0" eaLnBrk="1" latinLnBrk="0" hangingPunct="1">
+      <a:defRPr sz="1200" kern="1200">
+        <a:solidFill>
+          <a:schemeClr val="tx1"/>
+        </a:solidFill>
+        <a:latin typeface="+mn-lt"/>
+        <a:ea typeface="+mn-ea"/>
+        <a:cs typeface="+mn-cs"/>
+      </a:defRPr>
+    </a:lvl5pPr>
+    <a:lvl6pPr marL="2286000" algn="l" defTabSz="914400" rtl="0" eaLnBrk="1" latinLnBrk="0" hangingPunct="1">
+      <a:defRPr sz="1200" kern="1200">
+        <a:solidFill>
+          <a:schemeClr val="tx1"/>
+        </a:solidFill>
+        <a:latin typeface="+mn-lt"/>
+        <a:ea typeface="+mn-ea"/>
+        <a:cs typeface="+mn-cs"/>
+      </a:defRPr>
+    </a:lvl6pPr>
+    <a:lvl7pPr marL="2743200" algn="l" defTabSz="914400" rtl="0" eaLnBrk="1" latinLnBrk="0" hangingPunct="1">
+      <a:defRPr sz="1200" kern="1200">
+        <a:solidFill>
+          <a:schemeClr val="tx1"/>
+        </a:solidFill>
+        <a:latin typeface="+mn-lt"/>
+        <a:ea typeface="+mn-ea"/>
+        <a:cs typeface="+mn-cs"/>
+      </a:defRPr>
+    </a:lvl7pPr>
+    <a:lvl8pPr marL="3200400" algn="l" defTabSz="914400" rtl="0" eaLnBrk="1" latinLnBrk="0" hangingPunct="1">
+      <a:defRPr sz="1200" kern="1200">
+        <a:solidFill>
+          <a:schemeClr val="tx1"/>
+        </a:solidFill>
+        <a:latin typeface="+mn-lt"/>
+        <a:ea typeface="+mn-ea"/>
+        <a:cs typeface="+mn-cs"/>
+      </a:defRPr>
+    </a:lvl8pPr>
+    <a:lvl9pPr marL="3657600" algn="l" defTabSz="914400" rtl="0" eaLnBrk="1" latinLnBrk="0" hangingPunct="1">
+      <a:defRPr sz="1200" kern="1200">
+        <a:solidFill>
+          <a:schemeClr val="tx1"/>
+        </a:solidFill>
+        <a:latin typeface="+mn-lt"/>
+        <a:ea typeface="+mn-ea"/>
+        <a:cs typeface="+mn-cs"/>
+      </a:defRPr>
+    </a:lvl9pPr>
+  </p:notesStyle>
+</p:notesMaster>
+</file>
+
+<file path=ppt/notesSlides/notesSlide1.xml><?xml version="1.0" encoding="utf-8"?>
+<p:notes xmlns:a="http://schemas.openxmlformats.org/drawingml/2006/main" xmlns:r="http://schemas.openxmlformats.org/officeDocument/2006/relationships" xmlns:p="http://schemas.openxmlformats.org/presentationml/2006/main">
+  <p:cSld>
+    <p:spTree>
+      <p:nvGrpSpPr>
+        <p:cNvPr id="1" name=""/>
+        <p:cNvGrpSpPr/>
+        <p:nvPr/>
+      </p:nvGrpSpPr>
+      <p:grpSpPr>
+        <a:xfrm>
+          <a:off x="0" y="0"/>
+          <a:ext cx="0" cy="0"/>
+          <a:chOff x="0" y="0"/>
+          <a:chExt cx="0" cy="0"/>
+        </a:xfrm>
+      </p:grpSpPr>
+      <p:sp>
+        <p:nvSpPr>
+          <p:cNvPr id="2" name="Slide Image Placeholder 1"/>
+          <p:cNvSpPr>
+            <a:spLocks noGrp="1" noRot="1" noChangeAspect="1"/>
+          </p:cNvSpPr>
+          <p:nvPr>
+            <p:ph type="sldImg"/>
+          </p:nvPr>
+        </p:nvSpPr>
+        <p:spPr/>
+      </p:sp>
+      <p:sp>
+        <p:nvSpPr>
+          <p:cNvPr id="3" name="Notes Placeholder 2"/>
+          <p:cNvSpPr>
+            <a:spLocks noGrp="1"/>
+          </p:cNvSpPr>
+          <p:nvPr>
+            <p:ph type="body" idx="1"/>
+          </p:nvPr>
+        </p:nvSpPr>
+        <p:spPr/>
+        <p:txBody>
+          <a:bodyPr/>
+          <a:lstStyle/>
+          <a:p>
+            <a:r>
+              <a:rPr lang="en-MX" dirty="0"/>
+              <a:t>Hello, Thank you for watching my Video Presentation for the IBM Advance Data Science Capstone. I am Cesar Robles and I'm going to analyse the COVID outbreak in Mexico.</a:t>
+            </a:r>
+          </a:p>
+          <a:p>
+            <a:r>
+              <a:rPr lang="en-MX" dirty="0"/>
+              <a:t>Hope  you can find this video interesting and useful.</a:t>
+            </a:r>
+          </a:p>
+        </p:txBody>
+      </p:sp>
+      <p:sp>
+        <p:nvSpPr>
+          <p:cNvPr id="4" name="Slide Number Placeholder 3"/>
+          <p:cNvSpPr>
+            <a:spLocks noGrp="1"/>
+          </p:cNvSpPr>
+          <p:nvPr>
+            <p:ph type="sldNum" sz="quarter" idx="5"/>
+          </p:nvPr>
+        </p:nvSpPr>
+        <p:spPr/>
+        <p:txBody>
+          <a:bodyPr/>
+          <a:lstStyle/>
+          <a:p>
+            <a:fld id="{C72C844A-9A40-6A43-B5F1-D3CA0856CF8A}" type="slidenum">
+              <a:rPr lang="en-MX" smtClean="0"/>
+              <a:t>1</a:t>
+            </a:fld>
+            <a:endParaRPr lang="en-MX"/>
+          </a:p>
+        </p:txBody>
+      </p:sp>
+    </p:spTree>
+    <p:extLst>
+      <p:ext uri="{BB962C8B-B14F-4D97-AF65-F5344CB8AC3E}">
+        <p14:creationId xmlns:p14="http://schemas.microsoft.com/office/powerpoint/2010/main" val="4250079764"/>
+      </p:ext>
+    </p:extLst>
+  </p:cSld>
+  <p:clrMapOvr>
+    <a:masterClrMapping/>
+  </p:clrMapOvr>
+</p:notes>
+</file>
+
+<file path=ppt/notesSlides/notesSlide2.xml><?xml version="1.0" encoding="utf-8"?>
+<p:notes xmlns:a="http://schemas.openxmlformats.org/drawingml/2006/main" xmlns:r="http://schemas.openxmlformats.org/officeDocument/2006/relationships" xmlns:p="http://schemas.openxmlformats.org/presentationml/2006/main">
+  <p:cSld>
+    <p:spTree>
+      <p:nvGrpSpPr>
+        <p:cNvPr id="1" name=""/>
+        <p:cNvGrpSpPr/>
+        <p:nvPr/>
+      </p:nvGrpSpPr>
+      <p:grpSpPr>
+        <a:xfrm>
+          <a:off x="0" y="0"/>
+          <a:ext cx="0" cy="0"/>
+          <a:chOff x="0" y="0"/>
+          <a:chExt cx="0" cy="0"/>
+        </a:xfrm>
+      </p:grpSpPr>
+      <p:sp>
+        <p:nvSpPr>
+          <p:cNvPr id="2" name="Slide Image Placeholder 1"/>
+          <p:cNvSpPr>
+            <a:spLocks noGrp="1" noRot="1" noChangeAspect="1"/>
+          </p:cNvSpPr>
+          <p:nvPr>
+            <p:ph type="sldImg"/>
+          </p:nvPr>
+        </p:nvSpPr>
+        <p:spPr/>
+      </p:sp>
+      <p:sp>
+        <p:nvSpPr>
+          <p:cNvPr id="3" name="Notes Placeholder 2"/>
+          <p:cNvSpPr>
+            <a:spLocks noGrp="1"/>
+          </p:cNvSpPr>
+          <p:nvPr>
+            <p:ph type="body" idx="1"/>
+          </p:nvPr>
+        </p:nvSpPr>
+        <p:spPr/>
+        <p:txBody>
+          <a:bodyPr/>
+          <a:lstStyle/>
+          <a:p>
+            <a:r>
+              <a:rPr lang="en-MX" dirty="0"/>
+              <a:t>For this brief presentation, I follown the next content.</a:t>
+            </a:r>
+          </a:p>
+          <a:p>
+            <a:r>
+              <a:rPr lang="en-MX" dirty="0"/>
+              <a:t>* brief explanation of what is COVID</a:t>
+            </a:r>
+          </a:p>
+          <a:p>
+            <a:r>
+              <a:rPr lang="en-MX" dirty="0"/>
+              <a:t>* Where we can find and download the information</a:t>
+            </a:r>
+          </a:p>
+          <a:p>
+            <a:r>
+              <a:rPr lang="en-MX" dirty="0"/>
+              <a:t>* The distribution along the Mexican States</a:t>
+            </a:r>
+          </a:p>
+          <a:p>
+            <a:r>
+              <a:rPr lang="en-MX" dirty="0"/>
+              <a:t>* How is affecting the Mexican population</a:t>
+            </a:r>
+          </a:p>
+          <a:p>
+            <a:r>
+              <a:rPr lang="en-MX" dirty="0"/>
+              <a:t>* A daily confirm cases</a:t>
+            </a:r>
+          </a:p>
+          <a:p>
+            <a:r>
+              <a:rPr lang="en-MX" dirty="0"/>
+              <a:t>* A daily deceased cases</a:t>
+            </a:r>
+          </a:p>
+          <a:p>
+            <a:r>
+              <a:rPr lang="en-MX" dirty="0"/>
+              <a:t>* A brief explanation about the forecasting</a:t>
+            </a:r>
+          </a:p>
+          <a:p>
+            <a:r>
+              <a:rPr lang="en-MX" dirty="0"/>
+              <a:t>* and a SARIMAM model</a:t>
+            </a:r>
+          </a:p>
+        </p:txBody>
+      </p:sp>
+      <p:sp>
+        <p:nvSpPr>
+          <p:cNvPr id="4" name="Slide Number Placeholder 3"/>
+          <p:cNvSpPr>
+            <a:spLocks noGrp="1"/>
+          </p:cNvSpPr>
+          <p:nvPr>
+            <p:ph type="sldNum" sz="quarter" idx="5"/>
+          </p:nvPr>
+        </p:nvSpPr>
+        <p:spPr/>
+        <p:txBody>
+          <a:bodyPr/>
+          <a:lstStyle/>
+          <a:p>
+            <a:fld id="{C72C844A-9A40-6A43-B5F1-D3CA0856CF8A}" type="slidenum">
+              <a:rPr lang="en-MX" smtClean="0"/>
+              <a:t>2</a:t>
+            </a:fld>
+            <a:endParaRPr lang="en-MX"/>
+          </a:p>
+        </p:txBody>
+      </p:sp>
+    </p:spTree>
+    <p:extLst>
+      <p:ext uri="{BB962C8B-B14F-4D97-AF65-F5344CB8AC3E}">
+        <p14:creationId xmlns:p14="http://schemas.microsoft.com/office/powerpoint/2010/main" val="1136025637"/>
+      </p:ext>
+    </p:extLst>
+  </p:cSld>
+  <p:clrMapOvr>
+    <a:masterClrMapping/>
+  </p:clrMapOvr>
+</p:notes>
+</file>
+
+<file path=ppt/notesSlides/notesSlide3.xml><?xml version="1.0" encoding="utf-8"?>
+<p:notes xmlns:a="http://schemas.openxmlformats.org/drawingml/2006/main" xmlns:r="http://schemas.openxmlformats.org/officeDocument/2006/relationships" xmlns:p="http://schemas.openxmlformats.org/presentationml/2006/main">
+  <p:cSld>
+    <p:spTree>
+      <p:nvGrpSpPr>
+        <p:cNvPr id="1" name=""/>
+        <p:cNvGrpSpPr/>
+        <p:nvPr/>
+      </p:nvGrpSpPr>
+      <p:grpSpPr>
+        <a:xfrm>
+          <a:off x="0" y="0"/>
+          <a:ext cx="0" cy="0"/>
+          <a:chOff x="0" y="0"/>
+          <a:chExt cx="0" cy="0"/>
+        </a:xfrm>
+      </p:grpSpPr>
+      <p:sp>
+        <p:nvSpPr>
+          <p:cNvPr id="2" name="Slide Image Placeholder 1"/>
+          <p:cNvSpPr>
+            <a:spLocks noGrp="1" noRot="1" noChangeAspect="1"/>
+          </p:cNvSpPr>
+          <p:nvPr>
+            <p:ph type="sldImg"/>
+          </p:nvPr>
+        </p:nvSpPr>
+        <p:spPr/>
+      </p:sp>
+      <p:sp>
+        <p:nvSpPr>
+          <p:cNvPr id="3" name="Notes Placeholder 2"/>
+          <p:cNvSpPr>
+            <a:spLocks noGrp="1"/>
+          </p:cNvSpPr>
+          <p:nvPr>
+            <p:ph type="body" idx="1"/>
+          </p:nvPr>
+        </p:nvSpPr>
+        <p:spPr/>
+        <p:txBody>
+          <a:bodyPr/>
+          <a:lstStyle/>
+          <a:p>
+            <a:r>
+              <a:rPr lang="en-MX" dirty="0"/>
+              <a:t>The COVID outbreak is a infectious disease caused by the coronavirus, which is a respiratory pathogen.</a:t>
+            </a:r>
+          </a:p>
+          <a:p>
+            <a:r>
+              <a:rPr lang="en-MX" dirty="0"/>
+              <a:t>It is affecting all the world, but for this analysis we will focus our attention to Mexico. In this case, the outbreak began on February 2020 and util today we have near 800,000 confirmed cases and 88,000 deceased.</a:t>
+            </a:r>
+          </a:p>
+          <a:p>
+            <a:endParaRPr lang="en-MX" dirty="0"/>
+          </a:p>
+          <a:p>
+            <a:r>
+              <a:rPr lang="en-MX" dirty="0"/>
+              <a:t>The main idea is to understand how the COVID is propagatin along the Mexican states and how it affect in the near future.</a:t>
+            </a:r>
+          </a:p>
+        </p:txBody>
+      </p:sp>
+      <p:sp>
+        <p:nvSpPr>
+          <p:cNvPr id="4" name="Slide Number Placeholder 3"/>
+          <p:cNvSpPr>
+            <a:spLocks noGrp="1"/>
+          </p:cNvSpPr>
+          <p:nvPr>
+            <p:ph type="sldNum" sz="quarter" idx="5"/>
+          </p:nvPr>
+        </p:nvSpPr>
+        <p:spPr/>
+        <p:txBody>
+          <a:bodyPr/>
+          <a:lstStyle/>
+          <a:p>
+            <a:fld id="{C72C844A-9A40-6A43-B5F1-D3CA0856CF8A}" type="slidenum">
+              <a:rPr lang="en-MX" smtClean="0"/>
+              <a:t>3</a:t>
+            </a:fld>
+            <a:endParaRPr lang="en-MX"/>
+          </a:p>
+        </p:txBody>
+      </p:sp>
+    </p:spTree>
+    <p:extLst>
+      <p:ext uri="{BB962C8B-B14F-4D97-AF65-F5344CB8AC3E}">
+        <p14:creationId xmlns:p14="http://schemas.microsoft.com/office/powerpoint/2010/main" val="959076489"/>
+      </p:ext>
+    </p:extLst>
+  </p:cSld>
+  <p:clrMapOvr>
+    <a:masterClrMapping/>
+  </p:clrMapOvr>
+</p:notes>
 </file>
 
 <file path=ppt/slideLayouts/slideLayout1.xml><?xml version="1.0" encoding="utf-8"?>
@@ -3788,7 +4471,7 @@
           <p:nvPr/>
         </p:nvPicPr>
         <p:blipFill rotWithShape="1">
-          <a:blip r:embed="rId2"/>
+          <a:blip r:embed="rId3"/>
           <a:srcRect t="37628" b="22058"/>
           <a:stretch/>
         </p:blipFill>
@@ -4008,6 +4691,14 @@
   <p:clrMapOvr>
     <a:overrideClrMapping bg1="dk1" tx1="lt1" bg2="dk2" tx2="lt2" accent1="accent1" accent2="accent2" accent3="accent3" accent4="accent4" accent5="accent5" accent6="accent6" hlink="hlink" folHlink="folHlink"/>
   </p:clrMapOvr>
+  <mc:AlternateContent xmlns:mc="http://schemas.openxmlformats.org/markup-compatibility/2006" xmlns:p14="http://schemas.microsoft.com/office/powerpoint/2010/main">
+    <mc:Choice Requires="p14">
+      <p:transition spd="slow" p14:dur="2000" advTm="18191"/>
+    </mc:Choice>
+    <mc:Fallback xmlns="">
+      <p:transition spd="slow" advTm="18191"/>
+    </mc:Fallback>
+  </mc:AlternateContent>
 </p:sld>
 </file>
 
@@ -4155,6 +4846,14 @@
   <p:clrMapOvr>
     <a:masterClrMapping/>
   </p:clrMapOvr>
+  <mc:AlternateContent xmlns:mc="http://schemas.openxmlformats.org/markup-compatibility/2006" xmlns:p14="http://schemas.microsoft.com/office/powerpoint/2010/main">
+    <mc:Choice Requires="p14">
+      <p:transition spd="slow" p14:dur="2000" advTm="108579"/>
+    </mc:Choice>
+    <mc:Fallback xmlns="">
+      <p:transition spd="slow" advTm="108579"/>
+    </mc:Fallback>
+  </mc:AlternateContent>
 </p:sld>
 </file>
 
@@ -4283,6 +4982,14 @@
   <p:clrMapOvr>
     <a:masterClrMapping/>
   </p:clrMapOvr>
+  <mc:AlternateContent xmlns:mc="http://schemas.openxmlformats.org/markup-compatibility/2006" xmlns:p14="http://schemas.microsoft.com/office/powerpoint/2010/main">
+    <mc:Choice Requires="p14">
+      <p:transition spd="slow" p14:dur="2000" advTm="49838"/>
+    </mc:Choice>
+    <mc:Fallback xmlns="">
+      <p:transition spd="slow" advTm="49838"/>
+    </mc:Fallback>
+  </mc:AlternateContent>
 </p:sld>
 </file>
 
@@ -4443,6 +5150,14 @@
   <p:clrMapOvr>
     <a:masterClrMapping/>
   </p:clrMapOvr>
+  <mc:AlternateContent xmlns:mc="http://schemas.openxmlformats.org/markup-compatibility/2006" xmlns:p14="http://schemas.microsoft.com/office/powerpoint/2010/main">
+    <mc:Choice Requires="p14">
+      <p:transition spd="slow" p14:dur="2000" advTm="32347"/>
+    </mc:Choice>
+    <mc:Fallback xmlns="">
+      <p:transition spd="slow" advTm="32347"/>
+    </mc:Fallback>
+  </mc:AlternateContent>
 </p:sld>
 </file>
 
@@ -4567,7 +5282,7 @@
             <a:pPr algn="just"/>
             <a:r>
               <a:rPr lang="en-US" u="sng" dirty="0">
-                <a:hlinkClick r:id="rId2"/>
+                <a:hlinkClick r:id="rId3"/>
               </a:rPr>
               <a:t>https://en.wikipedia.org/wiki/COVID-19_pandemic_in_Mexico</a:t>
             </a:r>
@@ -4589,6 +5304,14 @@
   <p:clrMapOvr>
     <a:masterClrMapping/>
   </p:clrMapOvr>
+  <mc:AlternateContent xmlns:mc="http://schemas.openxmlformats.org/markup-compatibility/2006" xmlns:p14="http://schemas.microsoft.com/office/powerpoint/2010/main">
+    <mc:Choice Requires="p14">
+      <p:transition spd="slow" p14:dur="2000" advTm="57274"/>
+    </mc:Choice>
+    <mc:Fallback xmlns="">
+      <p:transition spd="slow" advTm="57274"/>
+    </mc:Fallback>
+  </mc:AlternateContent>
 </p:sld>
 </file>
 
@@ -4768,6 +5491,14 @@
   <p:clrMapOvr>
     <a:masterClrMapping/>
   </p:clrMapOvr>
+  <mc:AlternateContent xmlns:mc="http://schemas.openxmlformats.org/markup-compatibility/2006" xmlns:p14="http://schemas.microsoft.com/office/powerpoint/2010/main">
+    <mc:Choice Requires="p14">
+      <p:transition spd="slow" p14:dur="2000" advTm="79837"/>
+    </mc:Choice>
+    <mc:Fallback xmlns="">
+      <p:transition spd="slow" advTm="79837"/>
+    </mc:Fallback>
+  </mc:AlternateContent>
 </p:sld>
 </file>
 
@@ -4892,6 +5623,14 @@
   <p:clrMapOvr>
     <a:masterClrMapping/>
   </p:clrMapOvr>
+  <mc:AlternateContent xmlns:mc="http://schemas.openxmlformats.org/markup-compatibility/2006" xmlns:p14="http://schemas.microsoft.com/office/powerpoint/2010/main">
+    <mc:Choice Requires="p14">
+      <p:transition spd="slow" p14:dur="2000" advTm="48677"/>
+    </mc:Choice>
+    <mc:Fallback xmlns="">
+      <p:transition spd="slow" advTm="48677"/>
+    </mc:Fallback>
+  </mc:AlternateContent>
 </p:sld>
 </file>
 
@@ -5335,6 +6074,14 @@
   <p:clrMapOvr>
     <a:masterClrMapping/>
   </p:clrMapOvr>
+  <mc:AlternateContent xmlns:mc="http://schemas.openxmlformats.org/markup-compatibility/2006" xmlns:p14="http://schemas.microsoft.com/office/powerpoint/2010/main">
+    <mc:Choice Requires="p14">
+      <p:transition spd="slow" p14:dur="2000" advTm="61677"/>
+    </mc:Choice>
+    <mc:Fallback xmlns="">
+      <p:transition spd="slow" advTm="61677"/>
+    </mc:Fallback>
+  </mc:AlternateContent>
 </p:sld>
 </file>
 
@@ -5474,6 +6221,14 @@
   <p:clrMapOvr>
     <a:masterClrMapping/>
   </p:clrMapOvr>
+  <mc:AlternateContent xmlns:mc="http://schemas.openxmlformats.org/markup-compatibility/2006" xmlns:p14="http://schemas.microsoft.com/office/powerpoint/2010/main">
+    <mc:Choice Requires="p14">
+      <p:transition spd="slow" p14:dur="2000" advTm="67822"/>
+    </mc:Choice>
+    <mc:Fallback xmlns="">
+      <p:transition spd="slow" advTm="67822"/>
+    </mc:Fallback>
+  </mc:AlternateContent>
 </p:sld>
 </file>
 
@@ -5608,6 +6363,14 @@
   <p:clrMapOvr>
     <a:masterClrMapping/>
   </p:clrMapOvr>
+  <mc:AlternateContent xmlns:mc="http://schemas.openxmlformats.org/markup-compatibility/2006" xmlns:p14="http://schemas.microsoft.com/office/powerpoint/2010/main">
+    <mc:Choice Requires="p14">
+      <p:transition spd="slow" p14:dur="2000" advTm="32328"/>
+    </mc:Choice>
+    <mc:Fallback xmlns="">
+      <p:transition spd="slow" advTm="32328"/>
+    </mc:Fallback>
+  </mc:AlternateContent>
 </p:sld>
 </file>
 
@@ -5775,6 +6538,14 @@
   <p:clrMapOvr>
     <a:masterClrMapping/>
   </p:clrMapOvr>
+  <mc:AlternateContent xmlns:mc="http://schemas.openxmlformats.org/markup-compatibility/2006" xmlns:p14="http://schemas.microsoft.com/office/powerpoint/2010/main">
+    <mc:Choice Requires="p14">
+      <p:transition spd="slow" p14:dur="2000" advTm="120206"/>
+    </mc:Choice>
+    <mc:Fallback xmlns="">
+      <p:transition spd="slow" advTm="120206"/>
+    </mc:Fallback>
+  </mc:AlternateContent>
 </p:sld>
 </file>
 
@@ -6059,4 +6830,299 @@
     </a:ext>
   </a:extLst>
 </a:theme>
+</file>
+
+<file path=ppt/theme/theme2.xml><?xml version="1.0" encoding="utf-8"?>
+<a:theme xmlns:a="http://schemas.openxmlformats.org/drawingml/2006/main" name="Office Theme">
+  <a:themeElements>
+    <a:clrScheme name="Office">
+      <a:dk1>
+        <a:sysClr val="windowText" lastClr="000000"/>
+      </a:dk1>
+      <a:lt1>
+        <a:sysClr val="window" lastClr="FFFFFF"/>
+      </a:lt1>
+      <a:dk2>
+        <a:srgbClr val="44546A"/>
+      </a:dk2>
+      <a:lt2>
+        <a:srgbClr val="E7E6E6"/>
+      </a:lt2>
+      <a:accent1>
+        <a:srgbClr val="4472C4"/>
+      </a:accent1>
+      <a:accent2>
+        <a:srgbClr val="ED7D31"/>
+      </a:accent2>
+      <a:accent3>
+        <a:srgbClr val="A5A5A5"/>
+      </a:accent3>
+      <a:accent4>
+        <a:srgbClr val="FFC000"/>
+      </a:accent4>
+      <a:accent5>
+        <a:srgbClr val="5B9BD5"/>
+      </a:accent5>
+      <a:accent6>
+        <a:srgbClr val="70AD47"/>
+      </a:accent6>
+      <a:hlink>
+        <a:srgbClr val="0563C1"/>
+      </a:hlink>
+      <a:folHlink>
+        <a:srgbClr val="954F72"/>
+      </a:folHlink>
+    </a:clrScheme>
+    <a:fontScheme name="Office">
+      <a:majorFont>
+        <a:latin typeface="Calibri Light" panose="020F0302020204030204"/>
+        <a:ea typeface=""/>
+        <a:cs typeface=""/>
+        <a:font script="Jpan" typeface="游ゴシック Light"/>
+        <a:font script="Hang" typeface="맑은 고딕"/>
+        <a:font script="Hans" typeface="等线 Light"/>
+        <a:font script="Hant" typeface="新細明體"/>
+        <a:font script="Arab" typeface="Times New Roman"/>
+        <a:font script="Hebr" typeface="Times New Roman"/>
+        <a:font script="Thai" typeface="Angsana New"/>
+        <a:font script="Ethi" typeface="Nyala"/>
+        <a:font script="Beng" typeface="Vrinda"/>
+        <a:font script="Gujr" typeface="Shruti"/>
+        <a:font script="Khmr" typeface="MoolBoran"/>
+        <a:font script="Knda" typeface="Tunga"/>
+        <a:font script="Guru" typeface="Raavi"/>
+        <a:font script="Cans" typeface="Euphemia"/>
+        <a:font script="Cher" typeface="Plantagenet Cherokee"/>
+        <a:font script="Yiii" typeface="Microsoft Yi Baiti"/>
+        <a:font script="Tibt" typeface="Microsoft Himalaya"/>
+        <a:font script="Thaa" typeface="MV Boli"/>
+        <a:font script="Deva" typeface="Mangal"/>
+        <a:font script="Telu" typeface="Gautami"/>
+        <a:font script="Taml" typeface="Latha"/>
+        <a:font script="Syrc" typeface="Estrangelo Edessa"/>
+        <a:font script="Orya" typeface="Kalinga"/>
+        <a:font script="Mlym" typeface="Kartika"/>
+        <a:font script="Laoo" typeface="DokChampa"/>
+        <a:font script="Sinh" typeface="Iskoola Pota"/>
+        <a:font script="Mong" typeface="Mongolian Baiti"/>
+        <a:font script="Viet" typeface="Times New Roman"/>
+        <a:font script="Uigh" typeface="Microsoft Uighur"/>
+        <a:font script="Geor" typeface="Sylfaen"/>
+        <a:font script="Armn" typeface="Arial"/>
+        <a:font script="Bugi" typeface="Leelawadee UI"/>
+        <a:font script="Bopo" typeface="Microsoft JhengHei"/>
+        <a:font script="Java" typeface="Javanese Text"/>
+        <a:font script="Lisu" typeface="Segoe UI"/>
+        <a:font script="Mymr" typeface="Myanmar Text"/>
+        <a:font script="Nkoo" typeface="Ebrima"/>
+        <a:font script="Olck" typeface="Nirmala UI"/>
+        <a:font script="Osma" typeface="Ebrima"/>
+        <a:font script="Phag" typeface="Phagspa"/>
+        <a:font script="Syrn" typeface="Estrangelo Edessa"/>
+        <a:font script="Syrj" typeface="Estrangelo Edessa"/>
+        <a:font script="Syre" typeface="Estrangelo Edessa"/>
+        <a:font script="Sora" typeface="Nirmala UI"/>
+        <a:font script="Tale" typeface="Microsoft Tai Le"/>
+        <a:font script="Talu" typeface="Microsoft New Tai Lue"/>
+        <a:font script="Tfng" typeface="Ebrima"/>
+      </a:majorFont>
+      <a:minorFont>
+        <a:latin typeface="Calibri" panose="020F0502020204030204"/>
+        <a:ea typeface=""/>
+        <a:cs typeface=""/>
+        <a:font script="Jpan" typeface="游ゴシック"/>
+        <a:font script="Hang" typeface="맑은 고딕"/>
+        <a:font script="Hans" typeface="等线"/>
+        <a:font script="Hant" typeface="新細明體"/>
+        <a:font script="Arab" typeface="Arial"/>
+        <a:font script="Hebr" typeface="Arial"/>
+        <a:font script="Thai" typeface="Cordia New"/>
+        <a:font script="Ethi" typeface="Nyala"/>
+        <a:font script="Beng" typeface="Vrinda"/>
+        <a:font script="Gujr" typeface="Shruti"/>
+        <a:font script="Khmr" typeface="DaunPenh"/>
+        <a:font script="Knda" typeface="Tunga"/>
+        <a:font script="Guru" typeface="Raavi"/>
+        <a:font script="Cans" typeface="Euphemia"/>
+        <a:font script="Cher" typeface="Plantagenet Cherokee"/>
+        <a:font script="Yiii" typeface="Microsoft Yi Baiti"/>
+        <a:font script="Tibt" typeface="Microsoft Himalaya"/>
+        <a:font script="Thaa" typeface="MV Boli"/>
+        <a:font script="Deva" typeface="Mangal"/>
+        <a:font script="Telu" typeface="Gautami"/>
+        <a:font script="Taml" typeface="Latha"/>
+        <a:font script="Syrc" typeface="Estrangelo Edessa"/>
+        <a:font script="Orya" typeface="Kalinga"/>
+        <a:font script="Mlym" typeface="Kartika"/>
+        <a:font script="Laoo" typeface="DokChampa"/>
+        <a:font script="Sinh" typeface="Iskoola Pota"/>
+        <a:font script="Mong" typeface="Mongolian Baiti"/>
+        <a:font script="Viet" typeface="Arial"/>
+        <a:font script="Uigh" typeface="Microsoft Uighur"/>
+        <a:font script="Geor" typeface="Sylfaen"/>
+        <a:font script="Armn" typeface="Arial"/>
+        <a:font script="Bugi" typeface="Leelawadee UI"/>
+        <a:font script="Bopo" typeface="Microsoft JhengHei"/>
+        <a:font script="Java" typeface="Javanese Text"/>
+        <a:font script="Lisu" typeface="Segoe UI"/>
+        <a:font script="Mymr" typeface="Myanmar Text"/>
+        <a:font script="Nkoo" typeface="Ebrima"/>
+        <a:font script="Olck" typeface="Nirmala UI"/>
+        <a:font script="Osma" typeface="Ebrima"/>
+        <a:font script="Phag" typeface="Phagspa"/>
+        <a:font script="Syrn" typeface="Estrangelo Edessa"/>
+        <a:font script="Syrj" typeface="Estrangelo Edessa"/>
+        <a:font script="Syre" typeface="Estrangelo Edessa"/>
+        <a:font script="Sora" typeface="Nirmala UI"/>
+        <a:font script="Tale" typeface="Microsoft Tai Le"/>
+        <a:font script="Talu" typeface="Microsoft New Tai Lue"/>
+        <a:font script="Tfng" typeface="Ebrima"/>
+      </a:minorFont>
+    </a:fontScheme>
+    <a:fmtScheme name="Office">
+      <a:fillStyleLst>
+        <a:solidFill>
+          <a:schemeClr val="phClr"/>
+        </a:solidFill>
+        <a:gradFill rotWithShape="1">
+          <a:gsLst>
+            <a:gs pos="0">
+              <a:schemeClr val="phClr">
+                <a:lumMod val="110000"/>
+                <a:satMod val="105000"/>
+                <a:tint val="67000"/>
+              </a:schemeClr>
+            </a:gs>
+            <a:gs pos="50000">
+              <a:schemeClr val="phClr">
+                <a:lumMod val="105000"/>
+                <a:satMod val="103000"/>
+                <a:tint val="73000"/>
+              </a:schemeClr>
+            </a:gs>
+            <a:gs pos="100000">
+              <a:schemeClr val="phClr">
+                <a:lumMod val="105000"/>
+                <a:satMod val="109000"/>
+                <a:tint val="81000"/>
+              </a:schemeClr>
+            </a:gs>
+          </a:gsLst>
+          <a:lin ang="5400000" scaled="0"/>
+        </a:gradFill>
+        <a:gradFill rotWithShape="1">
+          <a:gsLst>
+            <a:gs pos="0">
+              <a:schemeClr val="phClr">
+                <a:satMod val="103000"/>
+                <a:lumMod val="102000"/>
+                <a:tint val="94000"/>
+              </a:schemeClr>
+            </a:gs>
+            <a:gs pos="50000">
+              <a:schemeClr val="phClr">
+                <a:satMod val="110000"/>
+                <a:lumMod val="100000"/>
+                <a:shade val="100000"/>
+              </a:schemeClr>
+            </a:gs>
+            <a:gs pos="100000">
+              <a:schemeClr val="phClr">
+                <a:lumMod val="99000"/>
+                <a:satMod val="120000"/>
+                <a:shade val="78000"/>
+              </a:schemeClr>
+            </a:gs>
+          </a:gsLst>
+          <a:lin ang="5400000" scaled="0"/>
+        </a:gradFill>
+      </a:fillStyleLst>
+      <a:lnStyleLst>
+        <a:ln w="6350" cap="flat" cmpd="sng" algn="ctr">
+          <a:solidFill>
+            <a:schemeClr val="phClr"/>
+          </a:solidFill>
+          <a:prstDash val="solid"/>
+          <a:miter lim="800000"/>
+        </a:ln>
+        <a:ln w="12700" cap="flat" cmpd="sng" algn="ctr">
+          <a:solidFill>
+            <a:schemeClr val="phClr"/>
+          </a:solidFill>
+          <a:prstDash val="solid"/>
+          <a:miter lim="800000"/>
+        </a:ln>
+        <a:ln w="19050" cap="flat" cmpd="sng" algn="ctr">
+          <a:solidFill>
+            <a:schemeClr val="phClr"/>
+          </a:solidFill>
+          <a:prstDash val="solid"/>
+          <a:miter lim="800000"/>
+        </a:ln>
+      </a:lnStyleLst>
+      <a:effectStyleLst>
+        <a:effectStyle>
+          <a:effectLst/>
+        </a:effectStyle>
+        <a:effectStyle>
+          <a:effectLst/>
+        </a:effectStyle>
+        <a:effectStyle>
+          <a:effectLst>
+            <a:outerShdw blurRad="57150" dist="19050" dir="5400000" algn="ctr" rotWithShape="0">
+              <a:srgbClr val="000000">
+                <a:alpha val="63000"/>
+              </a:srgbClr>
+            </a:outerShdw>
+          </a:effectLst>
+        </a:effectStyle>
+      </a:effectStyleLst>
+      <a:bgFillStyleLst>
+        <a:solidFill>
+          <a:schemeClr val="phClr"/>
+        </a:solidFill>
+        <a:solidFill>
+          <a:schemeClr val="phClr">
+            <a:tint val="95000"/>
+            <a:satMod val="170000"/>
+          </a:schemeClr>
+        </a:solidFill>
+        <a:gradFill rotWithShape="1">
+          <a:gsLst>
+            <a:gs pos="0">
+              <a:schemeClr val="phClr">
+                <a:tint val="93000"/>
+                <a:satMod val="150000"/>
+                <a:shade val="98000"/>
+                <a:lumMod val="102000"/>
+              </a:schemeClr>
+            </a:gs>
+            <a:gs pos="50000">
+              <a:schemeClr val="phClr">
+                <a:tint val="98000"/>
+                <a:satMod val="130000"/>
+                <a:shade val="90000"/>
+                <a:lumMod val="103000"/>
+              </a:schemeClr>
+            </a:gs>
+            <a:gs pos="100000">
+              <a:schemeClr val="phClr">
+                <a:shade val="63000"/>
+                <a:satMod val="120000"/>
+              </a:schemeClr>
+            </a:gs>
+          </a:gsLst>
+          <a:lin ang="5400000" scaled="0"/>
+        </a:gradFill>
+      </a:bgFillStyleLst>
+    </a:fmtScheme>
+  </a:themeElements>
+  <a:objectDefaults/>
+  <a:extraClrSchemeLst/>
+  <a:extLst>
+    <a:ext uri="{05A4C25C-085E-4340-85A3-A5531E510DB2}">
+      <thm15:themeFamily xmlns:thm15="http://schemas.microsoft.com/office/thememl/2012/main" name="Office Theme" id="{62F939B6-93AF-4DB8-9C6B-D6C7DFDC589F}" vid="{4A3C46E8-61CC-4603-A589-7422A47A8E4A}"/>
+    </a:ext>
+  </a:extLst>
+</a:theme>
 </file>
</xml_diff>